<commit_message>
client filename bug fixed
</commit_message>
<xml_diff>
--- a/Documents/95%.pptx
+++ b/Documents/95%.pptx
@@ -5,7 +5,7 @@
     <p:sldMasterId id="2147483738" r:id="rId1"/>
   </p:sldMasterIdLst>
   <p:notesMasterIdLst>
-    <p:notesMasterId r:id="rId10"/>
+    <p:notesMasterId r:id="rId11"/>
   </p:notesMasterIdLst>
   <p:sldIdLst>
     <p:sldId id="256" r:id="rId2"/>
@@ -14,8 +14,9 @@
     <p:sldId id="259" r:id="rId5"/>
     <p:sldId id="260" r:id="rId6"/>
     <p:sldId id="261" r:id="rId7"/>
-    <p:sldId id="262" r:id="rId8"/>
-    <p:sldId id="263" r:id="rId9"/>
+    <p:sldId id="264" r:id="rId8"/>
+    <p:sldId id="262" r:id="rId9"/>
+    <p:sldId id="263" r:id="rId10"/>
   </p:sldIdLst>
   <p:sldSz cx="12192000" cy="6858000"/>
   <p:notesSz cx="6858000" cy="9144000"/>
@@ -204,7 +205,7 @@
           <a:p>
             <a:fld id="{99EF76FD-B96A-4749-8EB1-F5B23D30627C}" type="datetimeFigureOut">
               <a:rPr lang="en-NL" smtClean="0"/>
-              <a:t>02/04/2024</a:t>
+              <a:t>16/05/2024</a:t>
             </a:fld>
             <a:endParaRPr lang="en-NL"/>
           </a:p>
@@ -2731,114 +2732,832 @@
           <a:lstStyle/>
           <a:p>
             <a:r>
-              <a:rPr lang="nl-NL" sz="1800" dirty="0" err="1">
-                <a:effectLst/>
-                <a:latin typeface="Calibri" panose="020F0502020204030204" pitchFamily="34" charset="0"/>
-                <a:ea typeface="PMingLiU" panose="02020500000000000000" pitchFamily="18" charset="-120"/>
-                <a:cs typeface="Times New Roman" panose="02020603050405020304" pitchFamily="18" charset="0"/>
-              </a:rPr>
-              <a:t>LoRa</a:t>
-            </a:r>
-            <a:r>
-              <a:rPr lang="nl-NL" sz="1800" dirty="0">
-                <a:effectLst/>
-                <a:latin typeface="Calibri" panose="020F0502020204030204" pitchFamily="34" charset="0"/>
-                <a:ea typeface="PMingLiU" panose="02020500000000000000" pitchFamily="18" charset="-120"/>
-                <a:cs typeface="Times New Roman" panose="02020603050405020304" pitchFamily="18" charset="0"/>
-              </a:rPr>
-              <a:t> is een draadloze modulatie techniek, die informatie via radio golven verstuurt in pulsen waardoor ze een vrij grote afstand kunnen overbruggen</a:t>
-            </a:r>
-          </a:p>
-          <a:p>
-            <a:endParaRPr lang="nl-NL" sz="1800" dirty="0">
-              <a:effectLst/>
-              <a:latin typeface="Calibri" panose="020F0502020204030204" pitchFamily="34" charset="0"/>
-              <a:ea typeface="PMingLiU" panose="02020500000000000000" pitchFamily="18" charset="-120"/>
-              <a:cs typeface="Times New Roman" panose="02020603050405020304" pitchFamily="18" charset="0"/>
-            </a:endParaRPr>
-          </a:p>
-          <a:p>
-            <a:r>
-              <a:rPr lang="nl-NL" sz="1800" dirty="0">
-                <a:effectLst/>
-                <a:latin typeface="Calibri" panose="020F0502020204030204" pitchFamily="34" charset="0"/>
-                <a:ea typeface="PMingLiU" panose="02020500000000000000" pitchFamily="18" charset="-120"/>
-                <a:cs typeface="Times New Roman" panose="02020603050405020304" pitchFamily="18" charset="0"/>
-              </a:rPr>
-              <a:t>de </a:t>
-            </a:r>
-            <a:r>
-              <a:rPr lang="nl-NL" sz="1800" dirty="0" err="1">
-                <a:effectLst/>
-                <a:latin typeface="Calibri" panose="020F0502020204030204" pitchFamily="34" charset="0"/>
-                <a:ea typeface="PMingLiU" panose="02020500000000000000" pitchFamily="18" charset="-120"/>
-                <a:cs typeface="Times New Roman" panose="02020603050405020304" pitchFamily="18" charset="0"/>
-              </a:rPr>
-              <a:t>LoRa</a:t>
-            </a:r>
-            <a:r>
-              <a:rPr lang="nl-NL" sz="1800" dirty="0">
-                <a:effectLst/>
-                <a:latin typeface="Calibri" panose="020F0502020204030204" pitchFamily="34" charset="0"/>
-                <a:ea typeface="PMingLiU" panose="02020500000000000000" pitchFamily="18" charset="-120"/>
-                <a:cs typeface="Times New Roman" panose="02020603050405020304" pitchFamily="18" charset="0"/>
-              </a:rPr>
-              <a:t> verzender kan via een </a:t>
-            </a:r>
-            <a:r>
-              <a:rPr lang="nl-NL" sz="1800" dirty="0" err="1">
-                <a:effectLst/>
-                <a:latin typeface="Calibri" panose="020F0502020204030204" pitchFamily="34" charset="0"/>
-                <a:ea typeface="PMingLiU" panose="02020500000000000000" pitchFamily="18" charset="-120"/>
-                <a:cs typeface="Times New Roman" panose="02020603050405020304" pitchFamily="18" charset="0"/>
-              </a:rPr>
-              <a:t>LoRaWAN</a:t>
-            </a:r>
-            <a:r>
-              <a:rPr lang="nl-NL" sz="1800" dirty="0">
-                <a:effectLst/>
-                <a:latin typeface="Calibri" panose="020F0502020204030204" pitchFamily="34" charset="0"/>
-                <a:ea typeface="PMingLiU" panose="02020500000000000000" pitchFamily="18" charset="-120"/>
-                <a:cs typeface="Times New Roman" panose="02020603050405020304" pitchFamily="18" charset="0"/>
-              </a:rPr>
-              <a:t> gateway verbinding maken met het internet. </a:t>
-            </a:r>
-            <a:r>
-              <a:rPr lang="nl-NL" sz="1800" dirty="0" err="1">
-                <a:effectLst/>
-                <a:latin typeface="Calibri" panose="020F0502020204030204" pitchFamily="34" charset="0"/>
-                <a:ea typeface="PMingLiU" panose="02020500000000000000" pitchFamily="18" charset="-120"/>
-                <a:cs typeface="Times New Roman" panose="02020603050405020304" pitchFamily="18" charset="0"/>
-              </a:rPr>
-              <a:t>LoRa</a:t>
-            </a:r>
-            <a:r>
-              <a:rPr lang="nl-NL" sz="1800" dirty="0">
-                <a:effectLst/>
-                <a:latin typeface="Calibri" panose="020F0502020204030204" pitchFamily="34" charset="0"/>
-                <a:ea typeface="PMingLiU" panose="02020500000000000000" pitchFamily="18" charset="-120"/>
-                <a:cs typeface="Times New Roman" panose="02020603050405020304" pitchFamily="18" charset="0"/>
-              </a:rPr>
-              <a:t> heeft een bereik van 2-5 Km in bebouwde gebieden. </a:t>
-            </a:r>
-          </a:p>
-          <a:p>
-            <a:endParaRPr lang="nl-NL" sz="1800" dirty="0">
-              <a:effectLst/>
-              <a:latin typeface="Calibri" panose="020F0502020204030204" pitchFamily="34" charset="0"/>
-              <a:ea typeface="PMingLiU" panose="02020500000000000000" pitchFamily="18" charset="-120"/>
-              <a:cs typeface="Times New Roman" panose="02020603050405020304" pitchFamily="18" charset="0"/>
-            </a:endParaRPr>
-          </a:p>
-          <a:p>
-            <a:r>
-              <a:rPr lang="nl-NL" sz="1800" dirty="0">
-                <a:effectLst/>
-                <a:latin typeface="Calibri" panose="020F0502020204030204" pitchFamily="34" charset="0"/>
-                <a:ea typeface="PMingLiU" panose="02020500000000000000" pitchFamily="18" charset="-120"/>
-                <a:cs typeface="Times New Roman" panose="02020603050405020304" pitchFamily="18" charset="0"/>
-              </a:rPr>
-              <a:t>NIET VEEL DATA OVER LORA</a:t>
+              <a:rPr lang="en-US" dirty="0"/>
+              <a:t>Om de IHM op </a:t>
+            </a:r>
+            <a:r>
+              <a:rPr lang="en-US" dirty="0" err="1"/>
+              <a:t>te</a:t>
+            </a:r>
+            <a:r>
+              <a:rPr lang="en-US" dirty="0"/>
+              <a:t> </a:t>
+            </a:r>
+            <a:r>
+              <a:rPr lang="en-US" dirty="0" err="1"/>
+              <a:t>slaan</a:t>
+            </a:r>
+            <a:r>
+              <a:rPr lang="en-US" dirty="0"/>
+              <a:t> </a:t>
+            </a:r>
+            <a:r>
+              <a:rPr lang="en-US" dirty="0" err="1"/>
+              <a:t>heb</a:t>
+            </a:r>
+            <a:r>
+              <a:rPr lang="en-US" dirty="0"/>
+              <a:t> </a:t>
+            </a:r>
+            <a:r>
+              <a:rPr lang="en-US" dirty="0" err="1"/>
+              <a:t>ik</a:t>
+            </a:r>
+            <a:r>
+              <a:rPr lang="en-US" dirty="0"/>
+              <a:t> </a:t>
+            </a:r>
+            <a:r>
+              <a:rPr lang="en-US" dirty="0" err="1"/>
+              <a:t>gekeken</a:t>
+            </a:r>
+            <a:r>
+              <a:rPr lang="en-US" dirty="0"/>
+              <a:t> </a:t>
+            </a:r>
+            <a:r>
+              <a:rPr lang="en-US" dirty="0" err="1"/>
+              <a:t>naar</a:t>
+            </a:r>
+            <a:r>
+              <a:rPr lang="en-US" dirty="0"/>
+              <a:t> de </a:t>
+            </a:r>
+            <a:r>
+              <a:rPr lang="en-US" dirty="0" err="1"/>
+              <a:t>opties</a:t>
+            </a:r>
+            <a:r>
+              <a:rPr lang="en-US" dirty="0"/>
+              <a:t>: databases, file servers, </a:t>
+            </a:r>
+            <a:r>
+              <a:rPr lang="en-US" dirty="0" err="1"/>
+              <a:t>github</a:t>
+            </a:r>
+            <a:r>
+              <a:rPr lang="en-US" dirty="0"/>
+              <a:t> </a:t>
+            </a:r>
+            <a:r>
+              <a:rPr lang="en-US" dirty="0" err="1"/>
+              <a:t>en</a:t>
+            </a:r>
+            <a:r>
+              <a:rPr lang="en-US" dirty="0"/>
+              <a:t> blockchain. De </a:t>
+            </a:r>
+            <a:r>
+              <a:rPr lang="en-US" dirty="0" err="1"/>
+              <a:t>belangrijkste</a:t>
+            </a:r>
+            <a:r>
+              <a:rPr lang="en-US" dirty="0"/>
+              <a:t> Eisen die </a:t>
+            </a:r>
+            <a:r>
+              <a:rPr lang="en-US" dirty="0" err="1"/>
+              <a:t>dit</a:t>
+            </a:r>
+            <a:r>
+              <a:rPr lang="en-US" dirty="0"/>
+              <a:t> </a:t>
+            </a:r>
+            <a:r>
+              <a:rPr lang="en-US" dirty="0" err="1"/>
+              <a:t>systeem</a:t>
+            </a:r>
+            <a:r>
+              <a:rPr lang="en-US" dirty="0"/>
+              <a:t> </a:t>
+            </a:r>
+            <a:r>
+              <a:rPr lang="en-US" dirty="0" err="1"/>
+              <a:t>moest</a:t>
+            </a:r>
+            <a:r>
+              <a:rPr lang="en-US" dirty="0"/>
+              <a:t> </a:t>
+            </a:r>
+            <a:r>
+              <a:rPr lang="en-US" dirty="0" err="1"/>
+              <a:t>hebben</a:t>
+            </a:r>
+            <a:r>
+              <a:rPr lang="en-US" dirty="0"/>
+              <a:t> </a:t>
+            </a:r>
+            <a:r>
+              <a:rPr lang="en-US" dirty="0" err="1"/>
+              <a:t>waren</a:t>
+            </a:r>
+            <a:r>
+              <a:rPr lang="en-US" dirty="0"/>
+              <a:t> </a:t>
+            </a:r>
+            <a:r>
+              <a:rPr lang="en-US" dirty="0" err="1"/>
+              <a:t>gegevens-integriteit</a:t>
+            </a:r>
+            <a:r>
+              <a:rPr lang="en-US" dirty="0"/>
+              <a:t>, </a:t>
+            </a:r>
+            <a:r>
+              <a:rPr lang="en-US" dirty="0" err="1"/>
+              <a:t>onveranderlijkheid</a:t>
+            </a:r>
+            <a:r>
+              <a:rPr lang="en-US" dirty="0"/>
+              <a:t> </a:t>
+            </a:r>
+            <a:r>
+              <a:rPr lang="en-US" dirty="0" err="1"/>
+              <a:t>en</a:t>
+            </a:r>
+            <a:r>
+              <a:rPr lang="en-US" dirty="0"/>
+              <a:t> </a:t>
+            </a:r>
+            <a:r>
+              <a:rPr lang="en-US" dirty="0" err="1"/>
+              <a:t>transparantie</a:t>
+            </a:r>
+            <a:r>
+              <a:rPr lang="en-US" dirty="0"/>
+              <a:t>. Binnen </a:t>
+            </a:r>
+            <a:r>
+              <a:rPr lang="en-US" dirty="0" err="1"/>
+              <a:t>deze</a:t>
+            </a:r>
+            <a:r>
+              <a:rPr lang="en-US" dirty="0"/>
+              <a:t> Eisen </a:t>
+            </a:r>
+            <a:r>
+              <a:rPr lang="en-US" dirty="0" err="1"/>
+              <a:t>waren</a:t>
+            </a:r>
+            <a:r>
+              <a:rPr lang="en-US" dirty="0"/>
+              <a:t> </a:t>
+            </a:r>
+            <a:r>
+              <a:rPr lang="en-US" dirty="0" err="1"/>
+              <a:t>github</a:t>
+            </a:r>
+            <a:r>
+              <a:rPr lang="en-US" dirty="0"/>
+              <a:t> </a:t>
+            </a:r>
+            <a:r>
+              <a:rPr lang="en-US" dirty="0" err="1"/>
+              <a:t>en</a:t>
+            </a:r>
+            <a:r>
+              <a:rPr lang="en-US" dirty="0"/>
+              <a:t> blockchain de </a:t>
+            </a:r>
+            <a:r>
+              <a:rPr lang="en-US" dirty="0" err="1"/>
+              <a:t>beste</a:t>
+            </a:r>
+            <a:r>
+              <a:rPr lang="en-US" dirty="0"/>
+              <a:t> </a:t>
+            </a:r>
+            <a:r>
+              <a:rPr lang="en-US" dirty="0" err="1"/>
+              <a:t>opties</a:t>
+            </a:r>
+            <a:r>
+              <a:rPr lang="en-US" dirty="0"/>
+              <a:t>. </a:t>
+            </a:r>
+            <a:r>
+              <a:rPr lang="en-US" dirty="0" err="1"/>
+              <a:t>Github</a:t>
+            </a:r>
+            <a:r>
+              <a:rPr lang="en-US" dirty="0"/>
+              <a:t> </a:t>
+            </a:r>
+            <a:r>
+              <a:rPr lang="en-US" dirty="0" err="1"/>
+              <a:t>als</a:t>
+            </a:r>
+            <a:r>
+              <a:rPr lang="en-US" dirty="0"/>
+              <a:t> </a:t>
+            </a:r>
+            <a:r>
+              <a:rPr lang="en-US" dirty="0" err="1"/>
+              <a:t>een</a:t>
+            </a:r>
+            <a:r>
+              <a:rPr lang="en-US" dirty="0"/>
+              <a:t> code platform </a:t>
+            </a:r>
+            <a:r>
+              <a:rPr lang="en-US" dirty="0" err="1"/>
+              <a:t>heeft</a:t>
+            </a:r>
+            <a:r>
+              <a:rPr lang="en-US" dirty="0"/>
+              <a:t> </a:t>
+            </a:r>
+            <a:r>
+              <a:rPr lang="en-US" dirty="0" err="1"/>
+              <a:t>een</a:t>
+            </a:r>
+            <a:r>
+              <a:rPr lang="en-US" dirty="0"/>
+              <a:t> erg </a:t>
+            </a:r>
+            <a:r>
+              <a:rPr lang="en-US" dirty="0" err="1"/>
+              <a:t>goed</a:t>
+            </a:r>
+            <a:r>
+              <a:rPr lang="en-US" dirty="0"/>
+              <a:t> </a:t>
+            </a:r>
+            <a:r>
+              <a:rPr lang="en-US" dirty="0" err="1"/>
+              <a:t>versiebeheer</a:t>
+            </a:r>
+            <a:r>
+              <a:rPr lang="en-US" dirty="0"/>
+              <a:t>. Maar blockchain was </a:t>
+            </a:r>
+            <a:r>
+              <a:rPr lang="en-US" dirty="0" err="1"/>
+              <a:t>toch</a:t>
+            </a:r>
+            <a:r>
+              <a:rPr lang="en-US" dirty="0"/>
+              <a:t> </a:t>
+            </a:r>
+            <a:r>
+              <a:rPr lang="en-US" dirty="0" err="1"/>
+              <a:t>beter</a:t>
+            </a:r>
+            <a:r>
+              <a:rPr lang="en-US" dirty="0"/>
+              <a:t> </a:t>
+            </a:r>
+            <a:r>
+              <a:rPr lang="en-US" dirty="0" err="1"/>
+              <a:t>voor</a:t>
+            </a:r>
+            <a:r>
+              <a:rPr lang="en-US" dirty="0"/>
+              <a:t> de </a:t>
+            </a:r>
+            <a:r>
+              <a:rPr lang="en-US" dirty="0" err="1"/>
+              <a:t>gegevens-integritieit</a:t>
+            </a:r>
+            <a:r>
+              <a:rPr lang="en-US" dirty="0"/>
+              <a:t> </a:t>
+            </a:r>
+            <a:r>
+              <a:rPr lang="en-US" dirty="0" err="1"/>
+              <a:t>en</a:t>
+            </a:r>
+            <a:r>
+              <a:rPr lang="en-US" dirty="0"/>
+              <a:t> </a:t>
+            </a:r>
+            <a:r>
+              <a:rPr lang="en-US" dirty="0" err="1"/>
+              <a:t>onveranderlijkheid</a:t>
+            </a:r>
+            <a:r>
+              <a:rPr lang="en-US" dirty="0"/>
+              <a:t>. Wat is blockchain? </a:t>
+            </a:r>
+            <a:r>
+              <a:rPr lang="en-US" dirty="0" err="1"/>
+              <a:t>Voorbeeld</a:t>
+            </a:r>
+            <a:r>
+              <a:rPr lang="en-US" dirty="0"/>
+              <a:t>… Elk block </a:t>
+            </a:r>
+            <a:r>
+              <a:rPr lang="en-US" dirty="0" err="1"/>
+              <a:t>bevat</a:t>
+            </a:r>
+            <a:r>
+              <a:rPr lang="en-US" dirty="0"/>
+              <a:t> </a:t>
+            </a:r>
+            <a:r>
+              <a:rPr lang="en-US" dirty="0" err="1"/>
+              <a:t>een</a:t>
+            </a:r>
+            <a:r>
+              <a:rPr lang="en-US" dirty="0"/>
+              <a:t> </a:t>
+            </a:r>
+            <a:r>
+              <a:rPr lang="en-US" dirty="0" err="1"/>
+              <a:t>stuk</a:t>
+            </a:r>
+            <a:r>
+              <a:rPr lang="en-US" dirty="0"/>
+              <a:t> </a:t>
+            </a:r>
+            <a:r>
+              <a:rPr lang="en-US" dirty="0" err="1"/>
+              <a:t>informatie</a:t>
+            </a:r>
+            <a:r>
+              <a:rPr lang="en-US" dirty="0"/>
+              <a:t>, </a:t>
+            </a:r>
+            <a:r>
+              <a:rPr lang="en-US" dirty="0" err="1"/>
+              <a:t>dus</a:t>
+            </a:r>
+            <a:r>
+              <a:rPr lang="en-US" dirty="0"/>
+              <a:t> </a:t>
+            </a:r>
+            <a:r>
+              <a:rPr lang="en-US" dirty="0" err="1"/>
+              <a:t>bijv</a:t>
+            </a:r>
+            <a:r>
+              <a:rPr lang="en-US" dirty="0"/>
+              <a:t> </a:t>
+            </a:r>
+            <a:r>
+              <a:rPr lang="en-US" dirty="0" err="1"/>
+              <a:t>een</a:t>
+            </a:r>
+            <a:r>
+              <a:rPr lang="en-US" dirty="0"/>
+              <a:t> </a:t>
+            </a:r>
+            <a:r>
+              <a:rPr lang="en-US" dirty="0" err="1"/>
+              <a:t>versie</a:t>
+            </a:r>
+            <a:r>
+              <a:rPr lang="en-US" dirty="0"/>
+              <a:t> van de IHM. </a:t>
+            </a:r>
+            <a:r>
+              <a:rPr lang="en-US" dirty="0" err="1"/>
+              <a:t>Eenmaal</a:t>
+            </a:r>
+            <a:r>
+              <a:rPr lang="en-US" dirty="0"/>
+              <a:t> </a:t>
+            </a:r>
+            <a:r>
+              <a:rPr lang="en-US" dirty="0" err="1"/>
+              <a:t>geupload</a:t>
+            </a:r>
+            <a:r>
+              <a:rPr lang="en-US" dirty="0"/>
+              <a:t> in de ‘chain’ (</a:t>
+            </a:r>
+            <a:r>
+              <a:rPr lang="en-US" dirty="0" err="1"/>
+              <a:t>een</a:t>
+            </a:r>
+            <a:r>
+              <a:rPr lang="en-US" dirty="0"/>
+              <a:t> link van blocks op </a:t>
+            </a:r>
+            <a:r>
+              <a:rPr lang="en-US" dirty="0" err="1"/>
+              <a:t>volgorde</a:t>
+            </a:r>
+            <a:r>
+              <a:rPr lang="en-US" dirty="0"/>
+              <a:t> </a:t>
+            </a:r>
+            <a:r>
+              <a:rPr lang="en-US" dirty="0" err="1"/>
+              <a:t>zoals</a:t>
+            </a:r>
+            <a:r>
+              <a:rPr lang="en-US" dirty="0"/>
+              <a:t> de </a:t>
+            </a:r>
+            <a:r>
+              <a:rPr lang="en-US" dirty="0" err="1"/>
+              <a:t>afbeelding</a:t>
+            </a:r>
+            <a:r>
+              <a:rPr lang="en-US" dirty="0"/>
+              <a:t>) </a:t>
+            </a:r>
+            <a:r>
+              <a:rPr lang="en-US" dirty="0" err="1"/>
+              <a:t>kan</a:t>
+            </a:r>
+            <a:r>
+              <a:rPr lang="en-US" dirty="0"/>
+              <a:t> de </a:t>
+            </a:r>
+            <a:r>
+              <a:rPr lang="en-US" dirty="0" err="1"/>
+              <a:t>informatie</a:t>
+            </a:r>
+            <a:r>
+              <a:rPr lang="en-US" dirty="0"/>
+              <a:t> </a:t>
+            </a:r>
+            <a:r>
+              <a:rPr lang="en-US" dirty="0" err="1"/>
+              <a:t>niet</a:t>
+            </a:r>
+            <a:r>
+              <a:rPr lang="en-US" dirty="0"/>
+              <a:t> </a:t>
+            </a:r>
+            <a:r>
+              <a:rPr lang="en-US" dirty="0" err="1"/>
+              <a:t>meer</a:t>
+            </a:r>
+            <a:r>
+              <a:rPr lang="en-US" dirty="0"/>
+              <a:t> </a:t>
+            </a:r>
+            <a:r>
+              <a:rPr lang="en-US" dirty="0" err="1"/>
+              <a:t>aangepast</a:t>
+            </a:r>
+            <a:r>
+              <a:rPr lang="en-US" dirty="0"/>
+              <a:t> </a:t>
+            </a:r>
+            <a:r>
+              <a:rPr lang="en-US" dirty="0" err="1"/>
+              <a:t>worden</a:t>
+            </a:r>
+            <a:r>
+              <a:rPr lang="en-US" dirty="0"/>
+              <a:t>. </a:t>
+            </a:r>
+            <a:r>
+              <a:rPr lang="en-US" dirty="0" err="1"/>
+              <a:t>Wel</a:t>
+            </a:r>
+            <a:r>
+              <a:rPr lang="en-US" dirty="0"/>
+              <a:t> </a:t>
+            </a:r>
+            <a:r>
+              <a:rPr lang="en-US" dirty="0" err="1"/>
+              <a:t>kan</a:t>
+            </a:r>
+            <a:r>
+              <a:rPr lang="en-US" dirty="0"/>
+              <a:t> het </a:t>
+            </a:r>
+            <a:r>
+              <a:rPr lang="en-US" dirty="0" err="1"/>
+              <a:t>geuploade</a:t>
+            </a:r>
+            <a:r>
+              <a:rPr lang="en-US" dirty="0"/>
+              <a:t> </a:t>
+            </a:r>
+            <a:r>
+              <a:rPr lang="en-US" dirty="0" err="1"/>
+              <a:t>bestand</a:t>
+            </a:r>
+            <a:r>
+              <a:rPr lang="en-US" dirty="0"/>
+              <a:t> </a:t>
+            </a:r>
+            <a:r>
+              <a:rPr lang="en-US" dirty="0" err="1"/>
+              <a:t>bekeken</a:t>
+            </a:r>
+            <a:r>
+              <a:rPr lang="en-US" dirty="0"/>
+              <a:t> </a:t>
+            </a:r>
+            <a:r>
+              <a:rPr lang="en-US" dirty="0" err="1"/>
+              <a:t>worden</a:t>
+            </a:r>
+            <a:r>
+              <a:rPr lang="en-US" dirty="0"/>
+              <a:t>. </a:t>
+            </a:r>
+            <a:r>
+              <a:rPr lang="en-US" dirty="0" err="1"/>
+              <a:t>Wanneer</a:t>
+            </a:r>
+            <a:r>
+              <a:rPr lang="en-US" dirty="0"/>
+              <a:t> </a:t>
+            </a:r>
+            <a:r>
+              <a:rPr lang="en-US" dirty="0" err="1"/>
+              <a:t>een</a:t>
+            </a:r>
+            <a:r>
+              <a:rPr lang="en-US" dirty="0"/>
+              <a:t> </a:t>
+            </a:r>
+            <a:r>
+              <a:rPr lang="en-US" dirty="0" err="1"/>
+              <a:t>nieuwe</a:t>
+            </a:r>
+            <a:r>
+              <a:rPr lang="en-US" dirty="0"/>
+              <a:t> </a:t>
+            </a:r>
+            <a:r>
+              <a:rPr lang="en-US" dirty="0" err="1"/>
+              <a:t>versie</a:t>
+            </a:r>
+            <a:r>
+              <a:rPr lang="en-US" dirty="0"/>
+              <a:t> van het IHM </a:t>
+            </a:r>
+            <a:r>
+              <a:rPr lang="en-US" dirty="0" err="1"/>
+              <a:t>nodig</a:t>
+            </a:r>
+            <a:r>
+              <a:rPr lang="en-US" dirty="0"/>
+              <a:t> is, </a:t>
+            </a:r>
+            <a:r>
+              <a:rPr lang="en-US" dirty="0" err="1"/>
+              <a:t>als</a:t>
+            </a:r>
+            <a:r>
+              <a:rPr lang="en-US" dirty="0"/>
+              <a:t> </a:t>
+            </a:r>
+            <a:r>
+              <a:rPr lang="en-US" dirty="0" err="1"/>
+              <a:t>bijv</a:t>
+            </a:r>
+            <a:r>
+              <a:rPr lang="en-US" dirty="0"/>
+              <a:t> er </a:t>
+            </a:r>
+            <a:r>
+              <a:rPr lang="en-US" dirty="0" err="1"/>
+              <a:t>asbest</a:t>
+            </a:r>
+            <a:r>
+              <a:rPr lang="en-US" dirty="0"/>
+              <a:t> is </a:t>
+            </a:r>
+            <a:r>
+              <a:rPr lang="en-US" dirty="0" err="1"/>
+              <a:t>weg</a:t>
+            </a:r>
+            <a:r>
+              <a:rPr lang="en-US" dirty="0"/>
+              <a:t> </a:t>
+            </a:r>
+            <a:r>
+              <a:rPr lang="en-US" dirty="0" err="1"/>
+              <a:t>gehaald</a:t>
+            </a:r>
+            <a:r>
+              <a:rPr lang="en-US" dirty="0"/>
+              <a:t>, dan </a:t>
+            </a:r>
+            <a:r>
+              <a:rPr lang="en-US" dirty="0" err="1"/>
+              <a:t>wordt</a:t>
+            </a:r>
+            <a:r>
+              <a:rPr lang="en-US" dirty="0"/>
+              <a:t> </a:t>
+            </a:r>
+            <a:r>
+              <a:rPr lang="en-US" dirty="0" err="1"/>
+              <a:t>deze</a:t>
+            </a:r>
+            <a:r>
+              <a:rPr lang="en-US" dirty="0"/>
+              <a:t> </a:t>
+            </a:r>
+            <a:r>
+              <a:rPr lang="en-US" dirty="0" err="1"/>
+              <a:t>versie</a:t>
+            </a:r>
+            <a:r>
+              <a:rPr lang="en-US" dirty="0"/>
+              <a:t> </a:t>
+            </a:r>
+            <a:r>
+              <a:rPr lang="en-US" dirty="0" err="1"/>
+              <a:t>aan</a:t>
+            </a:r>
+            <a:r>
+              <a:rPr lang="en-US" dirty="0"/>
+              <a:t> het </a:t>
+            </a:r>
+            <a:r>
+              <a:rPr lang="en-US" dirty="0" err="1"/>
+              <a:t>vorige</a:t>
+            </a:r>
+            <a:r>
+              <a:rPr lang="en-US" dirty="0"/>
+              <a:t> block </a:t>
+            </a:r>
+            <a:r>
+              <a:rPr lang="en-US" dirty="0" err="1"/>
+              <a:t>gechained</a:t>
+            </a:r>
+            <a:r>
+              <a:rPr lang="en-US" dirty="0"/>
+              <a:t>. Zo </a:t>
+            </a:r>
+            <a:r>
+              <a:rPr lang="en-US" dirty="0" err="1"/>
+              <a:t>heb</a:t>
+            </a:r>
+            <a:r>
+              <a:rPr lang="en-US" dirty="0"/>
+              <a:t> je </a:t>
+            </a:r>
+            <a:r>
+              <a:rPr lang="en-US" dirty="0" err="1"/>
+              <a:t>een</a:t>
+            </a:r>
+            <a:r>
+              <a:rPr lang="en-US" dirty="0"/>
+              <a:t> erg </a:t>
+            </a:r>
+            <a:r>
+              <a:rPr lang="en-US" dirty="0" err="1"/>
+              <a:t>goed</a:t>
+            </a:r>
+            <a:r>
+              <a:rPr lang="en-US" dirty="0"/>
+              <a:t> </a:t>
+            </a:r>
+            <a:r>
+              <a:rPr lang="en-US" dirty="0" err="1"/>
+              <a:t>versiebeheer</a:t>
+            </a:r>
+            <a:r>
+              <a:rPr lang="en-US" dirty="0"/>
+              <a:t> met </a:t>
+            </a:r>
+            <a:r>
+              <a:rPr lang="en-US" dirty="0" err="1"/>
+              <a:t>gebruiker</a:t>
+            </a:r>
+            <a:r>
+              <a:rPr lang="en-US" dirty="0"/>
+              <a:t> </a:t>
+            </a:r>
+            <a:r>
+              <a:rPr lang="en-US" dirty="0" err="1"/>
+              <a:t>en</a:t>
+            </a:r>
+            <a:r>
+              <a:rPr lang="en-US" dirty="0"/>
+              <a:t> timestamp maar </a:t>
+            </a:r>
+            <a:r>
+              <a:rPr lang="en-US" dirty="0" err="1"/>
+              <a:t>ook</a:t>
+            </a:r>
+            <a:r>
+              <a:rPr lang="en-US" dirty="0"/>
+              <a:t> de </a:t>
+            </a:r>
+            <a:r>
+              <a:rPr lang="en-US" dirty="0" err="1"/>
+              <a:t>onveranderlijkheid</a:t>
+            </a:r>
+            <a:r>
+              <a:rPr lang="en-US" dirty="0"/>
+              <a:t>. En </a:t>
+            </a:r>
+            <a:r>
+              <a:rPr lang="en-US" dirty="0" err="1"/>
+              <a:t>aangezien</a:t>
+            </a:r>
+            <a:r>
+              <a:rPr lang="en-US" dirty="0"/>
+              <a:t> </a:t>
+            </a:r>
+            <a:r>
+              <a:rPr lang="en-US" dirty="0" err="1"/>
+              <a:t>een</a:t>
+            </a:r>
+            <a:r>
+              <a:rPr lang="en-US" dirty="0"/>
+              <a:t> blockchain system </a:t>
+            </a:r>
+            <a:r>
+              <a:rPr lang="en-US" dirty="0" err="1"/>
+              <a:t>ook</a:t>
+            </a:r>
+            <a:r>
+              <a:rPr lang="en-US" dirty="0"/>
+              <a:t> </a:t>
+            </a:r>
+            <a:r>
+              <a:rPr lang="en-US" dirty="0" err="1"/>
+              <a:t>werkt</a:t>
+            </a:r>
+            <a:r>
+              <a:rPr lang="en-US" dirty="0"/>
+              <a:t> met hashes (</a:t>
+            </a:r>
+            <a:r>
+              <a:rPr lang="en-US" dirty="0" err="1"/>
+              <a:t>een</a:t>
+            </a:r>
+            <a:r>
+              <a:rPr lang="en-US" dirty="0"/>
+              <a:t> digitate </a:t>
+            </a:r>
+            <a:r>
+              <a:rPr lang="en-US" dirty="0" err="1"/>
+              <a:t>vingerafdruk</a:t>
+            </a:r>
+            <a:r>
+              <a:rPr lang="en-US" dirty="0"/>
+              <a:t> van het </a:t>
+            </a:r>
+            <a:r>
+              <a:rPr lang="en-US" dirty="0" err="1"/>
+              <a:t>bestand</a:t>
+            </a:r>
+            <a:r>
+              <a:rPr lang="en-US" dirty="0"/>
+              <a:t>) is </a:t>
+            </a:r>
+            <a:r>
+              <a:rPr lang="en-US" dirty="0" err="1"/>
+              <a:t>gemakkelijk</a:t>
+            </a:r>
+            <a:r>
+              <a:rPr lang="en-US" dirty="0"/>
+              <a:t> </a:t>
+            </a:r>
+            <a:r>
+              <a:rPr lang="en-US" dirty="0" err="1"/>
+              <a:t>te</a:t>
+            </a:r>
+            <a:r>
+              <a:rPr lang="en-US" dirty="0"/>
+              <a:t> </a:t>
+            </a:r>
+            <a:r>
+              <a:rPr lang="en-US" dirty="0" err="1"/>
+              <a:t>zien</a:t>
+            </a:r>
+            <a:r>
+              <a:rPr lang="en-US" dirty="0"/>
+              <a:t> of de </a:t>
+            </a:r>
+            <a:r>
+              <a:rPr lang="en-US" dirty="0" err="1"/>
+              <a:t>gegevensintegriteit</a:t>
+            </a:r>
+            <a:r>
+              <a:rPr lang="en-US" dirty="0"/>
+              <a:t> van </a:t>
+            </a:r>
+            <a:r>
+              <a:rPr lang="en-US" dirty="0" err="1"/>
+              <a:t>een</a:t>
+            </a:r>
+            <a:r>
+              <a:rPr lang="en-US" dirty="0"/>
+              <a:t> </a:t>
+            </a:r>
+            <a:r>
+              <a:rPr lang="en-US" dirty="0" err="1"/>
+              <a:t>bestand</a:t>
+            </a:r>
+            <a:r>
+              <a:rPr lang="en-US" dirty="0"/>
+              <a:t> in </a:t>
+            </a:r>
+            <a:r>
+              <a:rPr lang="en-US" dirty="0" err="1"/>
+              <a:t>orde</a:t>
+            </a:r>
+            <a:r>
+              <a:rPr lang="en-US" dirty="0"/>
+              <a:t> is. </a:t>
             </a:r>
           </a:p>
           <a:p>
@@ -2847,11 +3566,155 @@
           <a:p>
             <a:r>
               <a:rPr lang="en-US" dirty="0"/>
-              <a:t>Lora </a:t>
-            </a:r>
-            <a:r>
-              <a:rPr lang="en-US" dirty="0" err="1"/>
-              <a:t>goedkoop</a:t>
+              <a:t>Er </a:t>
+            </a:r>
+            <a:r>
+              <a:rPr lang="en-US" dirty="0" err="1"/>
+              <a:t>zijn</a:t>
+            </a:r>
+            <a:r>
+              <a:rPr lang="en-US" dirty="0"/>
+              <a:t> </a:t>
+            </a:r>
+            <a:r>
+              <a:rPr lang="en-US" dirty="0" err="1"/>
+              <a:t>publieke</a:t>
+            </a:r>
+            <a:r>
+              <a:rPr lang="en-US" dirty="0"/>
+              <a:t> blockchain systemin </a:t>
+            </a:r>
+            <a:r>
+              <a:rPr lang="en-US" dirty="0" err="1"/>
+              <a:t>zoals</a:t>
+            </a:r>
+            <a:r>
+              <a:rPr lang="en-US" dirty="0"/>
+              <a:t> blockchain, maar </a:t>
+            </a:r>
+            <a:r>
+              <a:rPr lang="en-US" dirty="0" err="1"/>
+              <a:t>aangezien</a:t>
+            </a:r>
+            <a:r>
+              <a:rPr lang="en-US" dirty="0"/>
+              <a:t> </a:t>
+            </a:r>
+            <a:r>
+              <a:rPr lang="en-US" dirty="0" err="1"/>
+              <a:t>dit</a:t>
+            </a:r>
+            <a:r>
+              <a:rPr lang="en-US" dirty="0"/>
+              <a:t> </a:t>
+            </a:r>
+            <a:r>
+              <a:rPr lang="en-US" dirty="0" err="1"/>
+              <a:t>systeem</a:t>
+            </a:r>
+            <a:r>
+              <a:rPr lang="en-US" dirty="0"/>
+              <a:t> </a:t>
+            </a:r>
+            <a:r>
+              <a:rPr lang="en-US" dirty="0" err="1"/>
+              <a:t>niet</a:t>
+            </a:r>
+            <a:r>
+              <a:rPr lang="en-US" dirty="0"/>
+              <a:t> door </a:t>
+            </a:r>
+            <a:r>
+              <a:rPr lang="en-US" dirty="0" err="1"/>
+              <a:t>iedereen</a:t>
+            </a:r>
+            <a:r>
+              <a:rPr lang="en-US" dirty="0"/>
+              <a:t> </a:t>
+            </a:r>
+            <a:r>
+              <a:rPr lang="en-US" dirty="0" err="1"/>
+              <a:t>ingelezen</a:t>
+            </a:r>
+            <a:r>
+              <a:rPr lang="en-US" dirty="0"/>
+              <a:t> mag </a:t>
+            </a:r>
+            <a:r>
+              <a:rPr lang="en-US" dirty="0" err="1"/>
+              <a:t>worden</a:t>
+            </a:r>
+            <a:r>
+              <a:rPr lang="en-US" dirty="0"/>
+              <a:t> is er </a:t>
+            </a:r>
+            <a:r>
+              <a:rPr lang="en-US" dirty="0" err="1"/>
+              <a:t>gekozen</a:t>
+            </a:r>
+            <a:r>
+              <a:rPr lang="en-US" dirty="0"/>
+              <a:t> </a:t>
+            </a:r>
+            <a:r>
+              <a:rPr lang="en-US" dirty="0" err="1"/>
+              <a:t>voor</a:t>
+            </a:r>
+            <a:r>
+              <a:rPr lang="en-US" dirty="0"/>
+              <a:t> </a:t>
+            </a:r>
+            <a:r>
+              <a:rPr lang="en-US" dirty="0" err="1"/>
+              <a:t>een</a:t>
+            </a:r>
+            <a:r>
+              <a:rPr lang="en-US" dirty="0"/>
+              <a:t> </a:t>
+            </a:r>
+            <a:r>
+              <a:rPr lang="en-US" dirty="0" err="1"/>
+              <a:t>zelfgeschreven</a:t>
+            </a:r>
+            <a:r>
+              <a:rPr lang="en-US" dirty="0"/>
+              <a:t> </a:t>
+            </a:r>
+            <a:r>
+              <a:rPr lang="en-US" dirty="0" err="1"/>
+              <a:t>prive</a:t>
+            </a:r>
+            <a:r>
+              <a:rPr lang="en-US" dirty="0"/>
+              <a:t> </a:t>
+            </a:r>
+            <a:r>
+              <a:rPr lang="en-US" dirty="0" err="1"/>
+              <a:t>netwerk</a:t>
+            </a:r>
+            <a:r>
+              <a:rPr lang="en-US" dirty="0"/>
+              <a:t>.  </a:t>
+            </a:r>
+            <a:r>
+              <a:rPr lang="en-US" dirty="0" err="1"/>
+              <a:t>Dit</a:t>
+            </a:r>
+            <a:r>
+              <a:rPr lang="en-US" dirty="0"/>
+              <a:t> door de </a:t>
+            </a:r>
+            <a:r>
+              <a:rPr lang="en-US" dirty="0" err="1"/>
+              <a:t>snelle</a:t>
+            </a:r>
+            <a:r>
+              <a:rPr lang="en-US" dirty="0"/>
+              <a:t> </a:t>
+            </a:r>
+            <a:r>
+              <a:rPr lang="en-US" dirty="0" err="1"/>
+              <a:t>ontwikkeltijd</a:t>
             </a:r>
             <a:r>
               <a:rPr lang="en-US" dirty="0"/>
@@ -2863,20 +3726,34 @@
             </a:r>
             <a:r>
               <a:rPr lang="en-US" dirty="0"/>
-              <a:t> </a:t>
-            </a:r>
-            <a:r>
-              <a:rPr lang="en-US" dirty="0" err="1"/>
-              <a:t>makelijke</a:t>
-            </a:r>
-            <a:r>
-              <a:rPr lang="en-US" dirty="0"/>
-              <a:t> </a:t>
-            </a:r>
-            <a:r>
-              <a:rPr lang="en-US" dirty="0" err="1"/>
-              <a:t>implementatie</a:t>
-            </a:r>
+              <a:t> de sensitives </a:t>
+            </a:r>
+            <a:r>
+              <a:rPr lang="en-US" dirty="0" err="1"/>
+              <a:t>informatie</a:t>
+            </a:r>
+            <a:r>
+              <a:rPr lang="en-US" dirty="0"/>
+              <a:t> </a:t>
+            </a:r>
+            <a:r>
+              <a:rPr lang="en-US" dirty="0" err="1"/>
+              <a:t>beter</a:t>
+            </a:r>
+            <a:r>
+              <a:rPr lang="en-US" dirty="0"/>
+              <a:t> is </a:t>
+            </a:r>
+            <a:r>
+              <a:rPr lang="en-US" dirty="0" err="1"/>
+              <a:t>beschermd</a:t>
+            </a:r>
+            <a:r>
+              <a:rPr lang="en-US" dirty="0"/>
+              <a:t>.</a:t>
+            </a:r>
+          </a:p>
+          <a:p>
             <a:endParaRPr lang="en-NL" dirty="0"/>
           </a:p>
         </p:txBody>
@@ -2907,7 +3784,7 @@
     </p:spTree>
     <p:extLst>
       <p:ext uri="{BB962C8B-B14F-4D97-AF65-F5344CB8AC3E}">
-        <p14:creationId xmlns:p14="http://schemas.microsoft.com/office/powerpoint/2010/main" val="2555242434"/>
+        <p14:creationId xmlns:p14="http://schemas.microsoft.com/office/powerpoint/2010/main" val="2242850920"/>
       </p:ext>
     </p:extLst>
   </p:cSld>
@@ -3130,6 +4007,237 @@
             <a:fld id="{5DF83CC5-2AD6-4A79-9F63-F9AAEFF73EC5}" type="slidenum">
               <a:rPr lang="en-NL" smtClean="0"/>
               <a:t>8</a:t>
+            </a:fld>
+            <a:endParaRPr lang="en-NL"/>
+          </a:p>
+        </p:txBody>
+      </p:sp>
+    </p:spTree>
+    <p:extLst>
+      <p:ext uri="{BB962C8B-B14F-4D97-AF65-F5344CB8AC3E}">
+        <p14:creationId xmlns:p14="http://schemas.microsoft.com/office/powerpoint/2010/main" val="2555242434"/>
+      </p:ext>
+    </p:extLst>
+  </p:cSld>
+  <p:clrMapOvr>
+    <a:masterClrMapping/>
+  </p:clrMapOvr>
+</p:notes>
+</file>
+
+<file path=ppt/notesSlides/notesSlide5.xml><?xml version="1.0" encoding="utf-8"?>
+<p:notes xmlns:a="http://schemas.openxmlformats.org/drawingml/2006/main" xmlns:r="http://schemas.openxmlformats.org/officeDocument/2006/relationships" xmlns:p="http://schemas.openxmlformats.org/presentationml/2006/main">
+  <p:cSld>
+    <p:spTree>
+      <p:nvGrpSpPr>
+        <p:cNvPr id="1" name=""/>
+        <p:cNvGrpSpPr/>
+        <p:nvPr/>
+      </p:nvGrpSpPr>
+      <p:grpSpPr>
+        <a:xfrm>
+          <a:off x="0" y="0"/>
+          <a:ext cx="0" cy="0"/>
+          <a:chOff x="0" y="0"/>
+          <a:chExt cx="0" cy="0"/>
+        </a:xfrm>
+      </p:grpSpPr>
+      <p:sp>
+        <p:nvSpPr>
+          <p:cNvPr id="2" name="Slide Image Placeholder 1"/>
+          <p:cNvSpPr>
+            <a:spLocks noGrp="1" noRot="1" noChangeAspect="1"/>
+          </p:cNvSpPr>
+          <p:nvPr>
+            <p:ph type="sldImg"/>
+          </p:nvPr>
+        </p:nvSpPr>
+        <p:spPr/>
+      </p:sp>
+      <p:sp>
+        <p:nvSpPr>
+          <p:cNvPr id="3" name="Notes Placeholder 2"/>
+          <p:cNvSpPr>
+            <a:spLocks noGrp="1"/>
+          </p:cNvSpPr>
+          <p:nvPr>
+            <p:ph type="body" idx="1"/>
+          </p:nvPr>
+        </p:nvSpPr>
+        <p:spPr/>
+        <p:txBody>
+          <a:bodyPr/>
+          <a:lstStyle/>
+          <a:p>
+            <a:r>
+              <a:rPr lang="nl-NL" sz="1800" dirty="0" err="1">
+                <a:effectLst/>
+                <a:latin typeface="Calibri" panose="020F0502020204030204" pitchFamily="34" charset="0"/>
+                <a:ea typeface="PMingLiU" panose="02020500000000000000" pitchFamily="18" charset="-120"/>
+                <a:cs typeface="Times New Roman" panose="02020603050405020304" pitchFamily="18" charset="0"/>
+              </a:rPr>
+              <a:t>LoRa</a:t>
+            </a:r>
+            <a:r>
+              <a:rPr lang="nl-NL" sz="1800" dirty="0">
+                <a:effectLst/>
+                <a:latin typeface="Calibri" panose="020F0502020204030204" pitchFamily="34" charset="0"/>
+                <a:ea typeface="PMingLiU" panose="02020500000000000000" pitchFamily="18" charset="-120"/>
+                <a:cs typeface="Times New Roman" panose="02020603050405020304" pitchFamily="18" charset="0"/>
+              </a:rPr>
+              <a:t> is een draadloze modulatie techniek, die informatie via radio golven verstuurt in pulsen waardoor ze een vrij grote afstand kunnen overbruggen</a:t>
+            </a:r>
+          </a:p>
+          <a:p>
+            <a:endParaRPr lang="nl-NL" sz="1800" dirty="0">
+              <a:effectLst/>
+              <a:latin typeface="Calibri" panose="020F0502020204030204" pitchFamily="34" charset="0"/>
+              <a:ea typeface="PMingLiU" panose="02020500000000000000" pitchFamily="18" charset="-120"/>
+              <a:cs typeface="Times New Roman" panose="02020603050405020304" pitchFamily="18" charset="0"/>
+            </a:endParaRPr>
+          </a:p>
+          <a:p>
+            <a:r>
+              <a:rPr lang="nl-NL" sz="1800" dirty="0">
+                <a:effectLst/>
+                <a:latin typeface="Calibri" panose="020F0502020204030204" pitchFamily="34" charset="0"/>
+                <a:ea typeface="PMingLiU" panose="02020500000000000000" pitchFamily="18" charset="-120"/>
+                <a:cs typeface="Times New Roman" panose="02020603050405020304" pitchFamily="18" charset="0"/>
+              </a:rPr>
+              <a:t>de </a:t>
+            </a:r>
+            <a:r>
+              <a:rPr lang="nl-NL" sz="1800" dirty="0" err="1">
+                <a:effectLst/>
+                <a:latin typeface="Calibri" panose="020F0502020204030204" pitchFamily="34" charset="0"/>
+                <a:ea typeface="PMingLiU" panose="02020500000000000000" pitchFamily="18" charset="-120"/>
+                <a:cs typeface="Times New Roman" panose="02020603050405020304" pitchFamily="18" charset="0"/>
+              </a:rPr>
+              <a:t>LoRa</a:t>
+            </a:r>
+            <a:r>
+              <a:rPr lang="nl-NL" sz="1800" dirty="0">
+                <a:effectLst/>
+                <a:latin typeface="Calibri" panose="020F0502020204030204" pitchFamily="34" charset="0"/>
+                <a:ea typeface="PMingLiU" panose="02020500000000000000" pitchFamily="18" charset="-120"/>
+                <a:cs typeface="Times New Roman" panose="02020603050405020304" pitchFamily="18" charset="0"/>
+              </a:rPr>
+              <a:t> verzender kan via een </a:t>
+            </a:r>
+            <a:r>
+              <a:rPr lang="nl-NL" sz="1800" dirty="0" err="1">
+                <a:effectLst/>
+                <a:latin typeface="Calibri" panose="020F0502020204030204" pitchFamily="34" charset="0"/>
+                <a:ea typeface="PMingLiU" panose="02020500000000000000" pitchFamily="18" charset="-120"/>
+                <a:cs typeface="Times New Roman" panose="02020603050405020304" pitchFamily="18" charset="0"/>
+              </a:rPr>
+              <a:t>LoRaWAN</a:t>
+            </a:r>
+            <a:r>
+              <a:rPr lang="nl-NL" sz="1800" dirty="0">
+                <a:effectLst/>
+                <a:latin typeface="Calibri" panose="020F0502020204030204" pitchFamily="34" charset="0"/>
+                <a:ea typeface="PMingLiU" panose="02020500000000000000" pitchFamily="18" charset="-120"/>
+                <a:cs typeface="Times New Roman" panose="02020603050405020304" pitchFamily="18" charset="0"/>
+              </a:rPr>
+              <a:t> gateway verbinding maken met het internet. </a:t>
+            </a:r>
+            <a:r>
+              <a:rPr lang="nl-NL" sz="1800" dirty="0" err="1">
+                <a:effectLst/>
+                <a:latin typeface="Calibri" panose="020F0502020204030204" pitchFamily="34" charset="0"/>
+                <a:ea typeface="PMingLiU" panose="02020500000000000000" pitchFamily="18" charset="-120"/>
+                <a:cs typeface="Times New Roman" panose="02020603050405020304" pitchFamily="18" charset="0"/>
+              </a:rPr>
+              <a:t>LoRa</a:t>
+            </a:r>
+            <a:r>
+              <a:rPr lang="nl-NL" sz="1800" dirty="0">
+                <a:effectLst/>
+                <a:latin typeface="Calibri" panose="020F0502020204030204" pitchFamily="34" charset="0"/>
+                <a:ea typeface="PMingLiU" panose="02020500000000000000" pitchFamily="18" charset="-120"/>
+                <a:cs typeface="Times New Roman" panose="02020603050405020304" pitchFamily="18" charset="0"/>
+              </a:rPr>
+              <a:t> heeft een bereik van 2-5 Km in bebouwde gebieden. </a:t>
+            </a:r>
+          </a:p>
+          <a:p>
+            <a:endParaRPr lang="nl-NL" sz="1800" dirty="0">
+              <a:effectLst/>
+              <a:latin typeface="Calibri" panose="020F0502020204030204" pitchFamily="34" charset="0"/>
+              <a:ea typeface="PMingLiU" panose="02020500000000000000" pitchFamily="18" charset="-120"/>
+              <a:cs typeface="Times New Roman" panose="02020603050405020304" pitchFamily="18" charset="0"/>
+            </a:endParaRPr>
+          </a:p>
+          <a:p>
+            <a:r>
+              <a:rPr lang="nl-NL" sz="1800" dirty="0">
+                <a:effectLst/>
+                <a:latin typeface="Calibri" panose="020F0502020204030204" pitchFamily="34" charset="0"/>
+                <a:ea typeface="PMingLiU" panose="02020500000000000000" pitchFamily="18" charset="-120"/>
+                <a:cs typeface="Times New Roman" panose="02020603050405020304" pitchFamily="18" charset="0"/>
+              </a:rPr>
+              <a:t>NIET VEEL DATA OVER LORA</a:t>
+            </a:r>
+          </a:p>
+          <a:p>
+            <a:endParaRPr lang="en-US" dirty="0"/>
+          </a:p>
+          <a:p>
+            <a:r>
+              <a:rPr lang="en-US" dirty="0"/>
+              <a:t>Lora </a:t>
+            </a:r>
+            <a:r>
+              <a:rPr lang="en-US" dirty="0" err="1"/>
+              <a:t>goedkoop</a:t>
+            </a:r>
+            <a:r>
+              <a:rPr lang="en-US" dirty="0"/>
+              <a:t> </a:t>
+            </a:r>
+            <a:r>
+              <a:rPr lang="en-US" dirty="0" err="1"/>
+              <a:t>en</a:t>
+            </a:r>
+            <a:r>
+              <a:rPr lang="en-US" dirty="0"/>
+              <a:t> </a:t>
+            </a:r>
+            <a:r>
+              <a:rPr lang="en-US" dirty="0" err="1"/>
+              <a:t>makelijke</a:t>
+            </a:r>
+            <a:r>
+              <a:rPr lang="en-US" dirty="0"/>
+              <a:t> </a:t>
+            </a:r>
+            <a:r>
+              <a:rPr lang="en-US" dirty="0" err="1"/>
+              <a:t>implementatie</a:t>
+            </a:r>
+            <a:endParaRPr lang="en-NL" dirty="0"/>
+          </a:p>
+        </p:txBody>
+      </p:sp>
+      <p:sp>
+        <p:nvSpPr>
+          <p:cNvPr id="4" name="Slide Number Placeholder 3"/>
+          <p:cNvSpPr>
+            <a:spLocks noGrp="1"/>
+          </p:cNvSpPr>
+          <p:nvPr>
+            <p:ph type="sldNum" sz="quarter" idx="5"/>
+          </p:nvPr>
+        </p:nvSpPr>
+        <p:spPr/>
+        <p:txBody>
+          <a:bodyPr/>
+          <a:lstStyle/>
+          <a:p>
+            <a:fld id="{5DF83CC5-2AD6-4A79-9F63-F9AAEFF73EC5}" type="slidenum">
+              <a:rPr lang="en-NL" smtClean="0"/>
+              <a:t>9</a:t>
             </a:fld>
             <a:endParaRPr lang="en-NL"/>
           </a:p>
@@ -3297,7 +4405,7 @@
           <a:p>
             <a:fld id="{3C2B07E4-CDF9-4C88-A2F3-04620E58224D}" type="datetimeFigureOut">
               <a:rPr lang="en-US" smtClean="0"/>
-              <a:t>4/2/2024</a:t>
+              <a:t>5/16/2024</a:t>
             </a:fld>
             <a:endParaRPr lang="en-US"/>
           </a:p>
@@ -3587,7 +4695,7 @@
           <a:p>
             <a:fld id="{3C2B07E4-CDF9-4C88-A2F3-04620E58224D}" type="datetimeFigureOut">
               <a:rPr lang="en-US" smtClean="0"/>
-              <a:t>4/2/2024</a:t>
+              <a:t>5/16/2024</a:t>
             </a:fld>
             <a:endParaRPr lang="en-US"/>
           </a:p>
@@ -3839,7 +4947,7 @@
           <a:p>
             <a:fld id="{3C2B07E4-CDF9-4C88-A2F3-04620E58224D}" type="datetimeFigureOut">
               <a:rPr lang="en-US" smtClean="0"/>
-              <a:t>4/2/2024</a:t>
+              <a:t>5/16/2024</a:t>
             </a:fld>
             <a:endParaRPr lang="en-US"/>
           </a:p>
@@ -4091,7 +5199,7 @@
           <a:p>
             <a:fld id="{3C2B07E4-CDF9-4C88-A2F3-04620E58224D}" type="datetimeFigureOut">
               <a:rPr lang="en-US" smtClean="0"/>
-              <a:t>4/2/2024</a:t>
+              <a:t>5/16/2024</a:t>
             </a:fld>
             <a:endParaRPr lang="en-US"/>
           </a:p>
@@ -4420,7 +5528,7 @@
           <a:p>
             <a:fld id="{3C2B07E4-CDF9-4C88-A2F3-04620E58224D}" type="datetimeFigureOut">
               <a:rPr lang="en-US" smtClean="0"/>
-              <a:t>4/2/2024</a:t>
+              <a:t>5/16/2024</a:t>
             </a:fld>
             <a:endParaRPr lang="en-US"/>
           </a:p>
@@ -4770,7 +5878,7 @@
           <a:p>
             <a:fld id="{3C2B07E4-CDF9-4C88-A2F3-04620E58224D}" type="datetimeFigureOut">
               <a:rPr lang="en-US" smtClean="0"/>
-              <a:t>4/2/2024</a:t>
+              <a:t>5/16/2024</a:t>
             </a:fld>
             <a:endParaRPr lang="en-US"/>
           </a:p>
@@ -5282,7 +6390,7 @@
           <a:p>
             <a:fld id="{3C2B07E4-CDF9-4C88-A2F3-04620E58224D}" type="datetimeFigureOut">
               <a:rPr lang="en-US" smtClean="0"/>
-              <a:t>4/2/2024</a:t>
+              <a:t>5/16/2024</a:t>
             </a:fld>
             <a:endParaRPr lang="en-US"/>
           </a:p>
@@ -5610,7 +6718,7 @@
           <a:p>
             <a:fld id="{3C2B07E4-CDF9-4C88-A2F3-04620E58224D}" type="datetimeFigureOut">
               <a:rPr lang="en-US" smtClean="0"/>
-              <a:t>4/2/2024</a:t>
+              <a:t>5/16/2024</a:t>
             </a:fld>
             <a:endParaRPr lang="en-US"/>
           </a:p>
@@ -5723,7 +6831,7 @@
           <a:p>
             <a:fld id="{3C2B07E4-CDF9-4C88-A2F3-04620E58224D}" type="datetimeFigureOut">
               <a:rPr lang="en-US" smtClean="0"/>
-              <a:t>4/2/2024</a:t>
+              <a:t>5/16/2024</a:t>
             </a:fld>
             <a:endParaRPr lang="en-US"/>
           </a:p>
@@ -6064,7 +7172,7 @@
           <a:p>
             <a:fld id="{3C2B07E4-CDF9-4C88-A2F3-04620E58224D}" type="datetimeFigureOut">
               <a:rPr lang="en-US" smtClean="0"/>
-              <a:t>4/2/2024</a:t>
+              <a:t>5/16/2024</a:t>
             </a:fld>
             <a:endParaRPr lang="en-US"/>
           </a:p>
@@ -6364,7 +7472,7 @@
           <a:p>
             <a:fld id="{3C2B07E4-CDF9-4C88-A2F3-04620E58224D}" type="datetimeFigureOut">
               <a:rPr lang="en-US" smtClean="0"/>
-              <a:t>4/2/2024</a:t>
+              <a:t>5/16/2024</a:t>
             </a:fld>
             <a:endParaRPr lang="en-US"/>
           </a:p>
@@ -6604,7 +7712,7 @@
             <a:fld id="{3C2B07E4-CDF9-4C88-A2F3-04620E58224D}" type="datetimeFigureOut">
               <a:rPr lang="en-US" smtClean="0"/>
               <a:pPr/>
-              <a:t>4/2/2024</a:t>
+              <a:t>5/16/2024</a:t>
             </a:fld>
             <a:endParaRPr lang="en-US" dirty="0"/>
           </a:p>
@@ -8863,6 +9971,187 @@
             </a:pPr>
             <a:r>
               <a:rPr lang="en-US" sz="2000" dirty="0"/>
+              <a:t>Accounts </a:t>
+            </a:r>
+            <a:r>
+              <a:rPr lang="en-US" sz="2000" dirty="0" err="1"/>
+              <a:t>en</a:t>
+            </a:r>
+            <a:r>
+              <a:rPr lang="en-US" sz="2000" dirty="0"/>
+              <a:t> interface</a:t>
+            </a:r>
+            <a:br>
+              <a:rPr lang="en-US" sz="2000" dirty="0"/>
+            </a:br>
+            <a:br>
+              <a:rPr lang="en-US" sz="2000" dirty="0"/>
+            </a:br>
+            <a:endParaRPr lang="en-NL" sz="2000" dirty="0"/>
+          </a:p>
+        </p:txBody>
+      </p:sp>
+      <p:sp>
+        <p:nvSpPr>
+          <p:cNvPr id="3" name="Content Placeholder 2">
+            <a:extLst>
+              <a:ext uri="{FF2B5EF4-FFF2-40B4-BE49-F238E27FC236}">
+                <a16:creationId xmlns:a16="http://schemas.microsoft.com/office/drawing/2014/main" id="{B75F8428-D75F-704C-928A-CD33A88A9153}"/>
+              </a:ext>
+            </a:extLst>
+          </p:cNvPr>
+          <p:cNvSpPr>
+            <a:spLocks noGrp="1"/>
+          </p:cNvSpPr>
+          <p:nvPr>
+            <p:ph idx="1"/>
+          </p:nvPr>
+        </p:nvSpPr>
+        <p:spPr/>
+        <p:txBody>
+          <a:bodyPr/>
+          <a:lstStyle/>
+          <a:p>
+            <a:endParaRPr lang="en-NL"/>
+          </a:p>
+        </p:txBody>
+      </p:sp>
+    </p:spTree>
+    <p:extLst>
+      <p:ext uri="{BB962C8B-B14F-4D97-AF65-F5344CB8AC3E}">
+        <p14:creationId xmlns:p14="http://schemas.microsoft.com/office/powerpoint/2010/main" val="3325695942"/>
+      </p:ext>
+    </p:extLst>
+  </p:cSld>
+  <p:clrMapOvr>
+    <a:overrideClrMapping bg1="lt1" tx1="dk1" bg2="lt2" tx2="dk2" accent1="accent1" accent2="accent2" accent3="accent3" accent4="accent4" accent5="accent5" accent6="accent6" hlink="hlink" folHlink="folHlink"/>
+  </p:clrMapOvr>
+</p:sld>
+</file>
+
+<file path=ppt/slides/slide8.xml><?xml version="1.0" encoding="utf-8"?>
+<p:sld xmlns:a="http://schemas.openxmlformats.org/drawingml/2006/main" xmlns:r="http://schemas.openxmlformats.org/officeDocument/2006/relationships" xmlns:p="http://schemas.openxmlformats.org/presentationml/2006/main">
+  <p:cSld>
+    <p:bg>
+      <p:bgPr>
+        <a:solidFill>
+          <a:schemeClr val="bg1"/>
+        </a:solidFill>
+        <a:effectLst/>
+      </p:bgPr>
+    </p:bg>
+    <p:spTree>
+      <p:nvGrpSpPr>
+        <p:cNvPr id="1" name=""/>
+        <p:cNvGrpSpPr/>
+        <p:nvPr/>
+      </p:nvGrpSpPr>
+      <p:grpSpPr>
+        <a:xfrm>
+          <a:off x="0" y="0"/>
+          <a:ext cx="0" cy="0"/>
+          <a:chOff x="0" y="0"/>
+          <a:chExt cx="0" cy="0"/>
+        </a:xfrm>
+      </p:grpSpPr>
+      <p:sp useBgFill="1">
+        <p:nvSpPr>
+          <p:cNvPr id="15" name="Rectangle 14">
+            <a:extLst>
+              <a:ext uri="{FF2B5EF4-FFF2-40B4-BE49-F238E27FC236}">
+                <a16:creationId xmlns:a16="http://schemas.microsoft.com/office/drawing/2014/main" id="{D7DD8518-4289-43CE-9E36-8E7E0D7DDF70}"/>
+              </a:ext>
+              <a:ext uri="{C183D7F6-B498-43B3-948B-1728B52AA6E4}">
+                <adec:decorative xmlns:adec="http://schemas.microsoft.com/office/drawing/2017/decorative" val="1"/>
+              </a:ext>
+            </a:extLst>
+          </p:cNvPr>
+          <p:cNvSpPr>
+            <a:spLocks noGrp="1" noRot="1" noChangeAspect="1" noMove="1" noResize="1" noEditPoints="1" noAdjustHandles="1" noChangeArrowheads="1" noChangeShapeType="1" noTextEdit="1"/>
+          </p:cNvSpPr>
+          <p:nvPr>
+            <p:extLst>
+              <p:ext uri="{386F3935-93C4-4BCD-93E2-E3B085C9AB24}">
+                <p16:designElem xmlns:p16="http://schemas.microsoft.com/office/powerpoint/2015/main" val="1"/>
+              </p:ext>
+            </p:extLst>
+          </p:nvPr>
+        </p:nvSpPr>
+        <p:spPr>
+          <a:xfrm>
+            <a:off x="0" y="0"/>
+            <a:ext cx="12192000" cy="6858000"/>
+          </a:xfrm>
+          <a:prstGeom prst="rect">
+            <a:avLst/>
+          </a:prstGeom>
+          <a:ln w="12700" cap="flat" cmpd="sng" algn="ctr">
+            <a:noFill/>
+            <a:prstDash val="solid"/>
+            <a:miter lim="800000"/>
+          </a:ln>
+          <a:effectLst/>
+        </p:spPr>
+        <p:style>
+          <a:lnRef idx="2">
+            <a:schemeClr val="accent1">
+              <a:shade val="50000"/>
+            </a:schemeClr>
+          </a:lnRef>
+          <a:fillRef idx="1">
+            <a:schemeClr val="accent1"/>
+          </a:fillRef>
+          <a:effectRef idx="0">
+            <a:schemeClr val="accent1"/>
+          </a:effectRef>
+          <a:fontRef idx="minor">
+            <a:schemeClr val="lt1"/>
+          </a:fontRef>
+        </p:style>
+        <p:txBody>
+          <a:bodyPr rtlCol="0" anchor="ctr"/>
+          <a:lstStyle/>
+          <a:p>
+            <a:pPr algn="ctr"/>
+            <a:endParaRPr lang="en-US"/>
+          </a:p>
+        </p:txBody>
+      </p:sp>
+      <p:sp>
+        <p:nvSpPr>
+          <p:cNvPr id="2" name="Title 1">
+            <a:extLst>
+              <a:ext uri="{FF2B5EF4-FFF2-40B4-BE49-F238E27FC236}">
+                <a16:creationId xmlns:a16="http://schemas.microsoft.com/office/drawing/2014/main" id="{807FBD87-1C7A-A13E-B5F7-BFAFF14050C2}"/>
+              </a:ext>
+            </a:extLst>
+          </p:cNvPr>
+          <p:cNvSpPr>
+            <a:spLocks noGrp="1"/>
+          </p:cNvSpPr>
+          <p:nvPr>
+            <p:ph type="title"/>
+          </p:nvPr>
+        </p:nvSpPr>
+        <p:spPr>
+          <a:xfrm>
+            <a:off x="1111117" y="1144996"/>
+            <a:ext cx="8236456" cy="1141004"/>
+          </a:xfrm>
+        </p:spPr>
+        <p:txBody>
+          <a:bodyPr>
+            <a:normAutofit/>
+          </a:bodyPr>
+          <a:lstStyle/>
+          <a:p>
+            <a:pPr>
+              <a:lnSpc>
+                <a:spcPct val="110000"/>
+              </a:lnSpc>
+            </a:pPr>
+            <a:r>
+              <a:rPr lang="en-US" sz="2000" dirty="0"/>
               <a:t>Hoe </a:t>
             </a:r>
             <a:r>
@@ -9051,6 +10340,24 @@
               <a:t>LoraWAN</a:t>
             </a:r>
             <a:endParaRPr lang="en-US" dirty="0"/>
+          </a:p>
+          <a:p>
+            <a:r>
+              <a:rPr lang="en-US" dirty="0" err="1"/>
+              <a:t>Mobiele</a:t>
+            </a:r>
+            <a:r>
+              <a:rPr lang="en-US" dirty="0"/>
+              <a:t> </a:t>
+            </a:r>
+            <a:r>
+              <a:rPr lang="en-US" dirty="0" err="1"/>
+              <a:t>telefoon</a:t>
+            </a:r>
+            <a:r>
+              <a:rPr lang="en-US" dirty="0"/>
+              <a:t> app</a:t>
+            </a:r>
           </a:p>
           <a:p>
             <a:endParaRPr lang="en-US" dirty="0"/>
@@ -9117,7 +10424,7 @@
 </p:sld>
 </file>
 
-<file path=ppt/slides/slide8.xml><?xml version="1.0" encoding="utf-8"?>
+<file path=ppt/slides/slide9.xml><?xml version="1.0" encoding="utf-8"?>
 <p:sld xmlns:a="http://schemas.openxmlformats.org/drawingml/2006/main" xmlns:r="http://schemas.openxmlformats.org/officeDocument/2006/relationships" xmlns:p="http://schemas.openxmlformats.org/presentationml/2006/main">
   <p:cSld>
     <p:bg>

</xml_diff>

<commit_message>
filled in 3/5 tests in test-plan
</commit_message>
<xml_diff>
--- a/Documents/95%.pptx
+++ b/Documents/95%.pptx
@@ -5,7 +5,7 @@
     <p:sldMasterId id="2147483738" r:id="rId1"/>
   </p:sldMasterIdLst>
   <p:notesMasterIdLst>
-    <p:notesMasterId r:id="rId11"/>
+    <p:notesMasterId r:id="rId12"/>
   </p:notesMasterIdLst>
   <p:sldIdLst>
     <p:sldId id="256" r:id="rId2"/>
@@ -17,6 +17,7 @@
     <p:sldId id="264" r:id="rId8"/>
     <p:sldId id="262" r:id="rId9"/>
     <p:sldId id="263" r:id="rId10"/>
+    <p:sldId id="266" r:id="rId11"/>
   </p:sldIdLst>
   <p:sldSz cx="12192000" cy="6858000"/>
   <p:notesSz cx="6858000" cy="9144000"/>
@@ -4247,6 +4248,237 @@
     <p:extLst>
       <p:ext uri="{BB962C8B-B14F-4D97-AF65-F5344CB8AC3E}">
         <p14:creationId xmlns:p14="http://schemas.microsoft.com/office/powerpoint/2010/main" val="154581262"/>
+      </p:ext>
+    </p:extLst>
+  </p:cSld>
+  <p:clrMapOvr>
+    <a:masterClrMapping/>
+  </p:clrMapOvr>
+</p:notes>
+</file>
+
+<file path=ppt/notesSlides/notesSlide6.xml><?xml version="1.0" encoding="utf-8"?>
+<p:notes xmlns:a="http://schemas.openxmlformats.org/drawingml/2006/main" xmlns:r="http://schemas.openxmlformats.org/officeDocument/2006/relationships" xmlns:p="http://schemas.openxmlformats.org/presentationml/2006/main">
+  <p:cSld>
+    <p:spTree>
+      <p:nvGrpSpPr>
+        <p:cNvPr id="1" name=""/>
+        <p:cNvGrpSpPr/>
+        <p:nvPr/>
+      </p:nvGrpSpPr>
+      <p:grpSpPr>
+        <a:xfrm>
+          <a:off x="0" y="0"/>
+          <a:ext cx="0" cy="0"/>
+          <a:chOff x="0" y="0"/>
+          <a:chExt cx="0" cy="0"/>
+        </a:xfrm>
+      </p:grpSpPr>
+      <p:sp>
+        <p:nvSpPr>
+          <p:cNvPr id="2" name="Slide Image Placeholder 1"/>
+          <p:cNvSpPr>
+            <a:spLocks noGrp="1" noRot="1" noChangeAspect="1"/>
+          </p:cNvSpPr>
+          <p:nvPr>
+            <p:ph type="sldImg"/>
+          </p:nvPr>
+        </p:nvSpPr>
+        <p:spPr/>
+      </p:sp>
+      <p:sp>
+        <p:nvSpPr>
+          <p:cNvPr id="3" name="Notes Placeholder 2"/>
+          <p:cNvSpPr>
+            <a:spLocks noGrp="1"/>
+          </p:cNvSpPr>
+          <p:nvPr>
+            <p:ph type="body" idx="1"/>
+          </p:nvPr>
+        </p:nvSpPr>
+        <p:spPr/>
+        <p:txBody>
+          <a:bodyPr/>
+          <a:lstStyle/>
+          <a:p>
+            <a:r>
+              <a:rPr lang="nl-NL" sz="1800" dirty="0" err="1">
+                <a:effectLst/>
+                <a:latin typeface="Calibri" panose="020F0502020204030204" pitchFamily="34" charset="0"/>
+                <a:ea typeface="PMingLiU" panose="02020500000000000000" pitchFamily="18" charset="-120"/>
+                <a:cs typeface="Times New Roman" panose="02020603050405020304" pitchFamily="18" charset="0"/>
+              </a:rPr>
+              <a:t>LoRa</a:t>
+            </a:r>
+            <a:r>
+              <a:rPr lang="nl-NL" sz="1800" dirty="0">
+                <a:effectLst/>
+                <a:latin typeface="Calibri" panose="020F0502020204030204" pitchFamily="34" charset="0"/>
+                <a:ea typeface="PMingLiU" panose="02020500000000000000" pitchFamily="18" charset="-120"/>
+                <a:cs typeface="Times New Roman" panose="02020603050405020304" pitchFamily="18" charset="0"/>
+              </a:rPr>
+              <a:t> is een draadloze modulatie techniek, die informatie via radio golven verstuurt in pulsen waardoor ze een vrij grote afstand kunnen overbruggen</a:t>
+            </a:r>
+          </a:p>
+          <a:p>
+            <a:endParaRPr lang="nl-NL" sz="1800" dirty="0">
+              <a:effectLst/>
+              <a:latin typeface="Calibri" panose="020F0502020204030204" pitchFamily="34" charset="0"/>
+              <a:ea typeface="PMingLiU" panose="02020500000000000000" pitchFamily="18" charset="-120"/>
+              <a:cs typeface="Times New Roman" panose="02020603050405020304" pitchFamily="18" charset="0"/>
+            </a:endParaRPr>
+          </a:p>
+          <a:p>
+            <a:r>
+              <a:rPr lang="nl-NL" sz="1800" dirty="0">
+                <a:effectLst/>
+                <a:latin typeface="Calibri" panose="020F0502020204030204" pitchFamily="34" charset="0"/>
+                <a:ea typeface="PMingLiU" panose="02020500000000000000" pitchFamily="18" charset="-120"/>
+                <a:cs typeface="Times New Roman" panose="02020603050405020304" pitchFamily="18" charset="0"/>
+              </a:rPr>
+              <a:t>de </a:t>
+            </a:r>
+            <a:r>
+              <a:rPr lang="nl-NL" sz="1800" dirty="0" err="1">
+                <a:effectLst/>
+                <a:latin typeface="Calibri" panose="020F0502020204030204" pitchFamily="34" charset="0"/>
+                <a:ea typeface="PMingLiU" panose="02020500000000000000" pitchFamily="18" charset="-120"/>
+                <a:cs typeface="Times New Roman" panose="02020603050405020304" pitchFamily="18" charset="0"/>
+              </a:rPr>
+              <a:t>LoRa</a:t>
+            </a:r>
+            <a:r>
+              <a:rPr lang="nl-NL" sz="1800" dirty="0">
+                <a:effectLst/>
+                <a:latin typeface="Calibri" panose="020F0502020204030204" pitchFamily="34" charset="0"/>
+                <a:ea typeface="PMingLiU" panose="02020500000000000000" pitchFamily="18" charset="-120"/>
+                <a:cs typeface="Times New Roman" panose="02020603050405020304" pitchFamily="18" charset="0"/>
+              </a:rPr>
+              <a:t> verzender kan via een </a:t>
+            </a:r>
+            <a:r>
+              <a:rPr lang="nl-NL" sz="1800" dirty="0" err="1">
+                <a:effectLst/>
+                <a:latin typeface="Calibri" panose="020F0502020204030204" pitchFamily="34" charset="0"/>
+                <a:ea typeface="PMingLiU" panose="02020500000000000000" pitchFamily="18" charset="-120"/>
+                <a:cs typeface="Times New Roman" panose="02020603050405020304" pitchFamily="18" charset="0"/>
+              </a:rPr>
+              <a:t>LoRaWAN</a:t>
+            </a:r>
+            <a:r>
+              <a:rPr lang="nl-NL" sz="1800" dirty="0">
+                <a:effectLst/>
+                <a:latin typeface="Calibri" panose="020F0502020204030204" pitchFamily="34" charset="0"/>
+                <a:ea typeface="PMingLiU" panose="02020500000000000000" pitchFamily="18" charset="-120"/>
+                <a:cs typeface="Times New Roman" panose="02020603050405020304" pitchFamily="18" charset="0"/>
+              </a:rPr>
+              <a:t> gateway verbinding maken met het internet. </a:t>
+            </a:r>
+            <a:r>
+              <a:rPr lang="nl-NL" sz="1800" dirty="0" err="1">
+                <a:effectLst/>
+                <a:latin typeface="Calibri" panose="020F0502020204030204" pitchFamily="34" charset="0"/>
+                <a:ea typeface="PMingLiU" panose="02020500000000000000" pitchFamily="18" charset="-120"/>
+                <a:cs typeface="Times New Roman" panose="02020603050405020304" pitchFamily="18" charset="0"/>
+              </a:rPr>
+              <a:t>LoRa</a:t>
+            </a:r>
+            <a:r>
+              <a:rPr lang="nl-NL" sz="1800" dirty="0">
+                <a:effectLst/>
+                <a:latin typeface="Calibri" panose="020F0502020204030204" pitchFamily="34" charset="0"/>
+                <a:ea typeface="PMingLiU" panose="02020500000000000000" pitchFamily="18" charset="-120"/>
+                <a:cs typeface="Times New Roman" panose="02020603050405020304" pitchFamily="18" charset="0"/>
+              </a:rPr>
+              <a:t> heeft een bereik van 2-5 Km in bebouwde gebieden. </a:t>
+            </a:r>
+          </a:p>
+          <a:p>
+            <a:endParaRPr lang="nl-NL" sz="1800" dirty="0">
+              <a:effectLst/>
+              <a:latin typeface="Calibri" panose="020F0502020204030204" pitchFamily="34" charset="0"/>
+              <a:ea typeface="PMingLiU" panose="02020500000000000000" pitchFamily="18" charset="-120"/>
+              <a:cs typeface="Times New Roman" panose="02020603050405020304" pitchFamily="18" charset="0"/>
+            </a:endParaRPr>
+          </a:p>
+          <a:p>
+            <a:r>
+              <a:rPr lang="nl-NL" sz="1800" dirty="0">
+                <a:effectLst/>
+                <a:latin typeface="Calibri" panose="020F0502020204030204" pitchFamily="34" charset="0"/>
+                <a:ea typeface="PMingLiU" panose="02020500000000000000" pitchFamily="18" charset="-120"/>
+                <a:cs typeface="Times New Roman" panose="02020603050405020304" pitchFamily="18" charset="0"/>
+              </a:rPr>
+              <a:t>NIET VEEL DATA OVER LORA</a:t>
+            </a:r>
+          </a:p>
+          <a:p>
+            <a:endParaRPr lang="en-US" dirty="0"/>
+          </a:p>
+          <a:p>
+            <a:r>
+              <a:rPr lang="en-US" dirty="0"/>
+              <a:t>Lora </a:t>
+            </a:r>
+            <a:r>
+              <a:rPr lang="en-US" dirty="0" err="1"/>
+              <a:t>goedkoop</a:t>
+            </a:r>
+            <a:r>
+              <a:rPr lang="en-US" dirty="0"/>
+              <a:t> </a:t>
+            </a:r>
+            <a:r>
+              <a:rPr lang="en-US" dirty="0" err="1"/>
+              <a:t>en</a:t>
+            </a:r>
+            <a:r>
+              <a:rPr lang="en-US" dirty="0"/>
+              <a:t> </a:t>
+            </a:r>
+            <a:r>
+              <a:rPr lang="en-US" dirty="0" err="1"/>
+              <a:t>makelijke</a:t>
+            </a:r>
+            <a:r>
+              <a:rPr lang="en-US" dirty="0"/>
+              <a:t> </a:t>
+            </a:r>
+            <a:r>
+              <a:rPr lang="en-US" dirty="0" err="1"/>
+              <a:t>implementatie</a:t>
+            </a:r>
+            <a:endParaRPr lang="en-NL" dirty="0"/>
+          </a:p>
+        </p:txBody>
+      </p:sp>
+      <p:sp>
+        <p:nvSpPr>
+          <p:cNvPr id="4" name="Slide Number Placeholder 3"/>
+          <p:cNvSpPr>
+            <a:spLocks noGrp="1"/>
+          </p:cNvSpPr>
+          <p:nvPr>
+            <p:ph type="sldNum" sz="quarter" idx="5"/>
+          </p:nvPr>
+        </p:nvSpPr>
+        <p:spPr/>
+        <p:txBody>
+          <a:bodyPr/>
+          <a:lstStyle/>
+          <a:p>
+            <a:fld id="{5DF83CC5-2AD6-4A79-9F63-F9AAEFF73EC5}" type="slidenum">
+              <a:rPr lang="en-NL" smtClean="0"/>
+              <a:t>10</a:t>
+            </a:fld>
+            <a:endParaRPr lang="en-NL"/>
+          </a:p>
+        </p:txBody>
+      </p:sp>
+    </p:spTree>
+    <p:extLst>
+      <p:ext uri="{BB962C8B-B14F-4D97-AF65-F5344CB8AC3E}">
+        <p14:creationId xmlns:p14="http://schemas.microsoft.com/office/powerpoint/2010/main" val="2117918725"/>
       </p:ext>
     </p:extLst>
   </p:cSld>
@@ -8466,6 +8698,239 @@
 </p:sld>
 </file>
 
+<file path=ppt/slides/slide10.xml><?xml version="1.0" encoding="utf-8"?>
+<p:sld xmlns:a="http://schemas.openxmlformats.org/drawingml/2006/main" xmlns:r="http://schemas.openxmlformats.org/officeDocument/2006/relationships" xmlns:p="http://schemas.openxmlformats.org/presentationml/2006/main">
+  <p:cSld>
+    <p:bg>
+      <p:bgPr>
+        <a:solidFill>
+          <a:schemeClr val="bg1"/>
+        </a:solidFill>
+        <a:effectLst/>
+      </p:bgPr>
+    </p:bg>
+    <p:spTree>
+      <p:nvGrpSpPr>
+        <p:cNvPr id="1" name=""/>
+        <p:cNvGrpSpPr/>
+        <p:nvPr/>
+      </p:nvGrpSpPr>
+      <p:grpSpPr>
+        <a:xfrm>
+          <a:off x="0" y="0"/>
+          <a:ext cx="0" cy="0"/>
+          <a:chOff x="0" y="0"/>
+          <a:chExt cx="0" cy="0"/>
+        </a:xfrm>
+      </p:grpSpPr>
+      <p:sp useBgFill="1">
+        <p:nvSpPr>
+          <p:cNvPr id="15" name="Rectangle 14">
+            <a:extLst>
+              <a:ext uri="{FF2B5EF4-FFF2-40B4-BE49-F238E27FC236}">
+                <a16:creationId xmlns:a16="http://schemas.microsoft.com/office/drawing/2014/main" id="{D7DD8518-4289-43CE-9E36-8E7E0D7DDF70}"/>
+              </a:ext>
+              <a:ext uri="{C183D7F6-B498-43B3-948B-1728B52AA6E4}">
+                <adec:decorative xmlns:adec="http://schemas.microsoft.com/office/drawing/2017/decorative" val="1"/>
+              </a:ext>
+            </a:extLst>
+          </p:cNvPr>
+          <p:cNvSpPr>
+            <a:spLocks noGrp="1" noRot="1" noChangeAspect="1" noMove="1" noResize="1" noEditPoints="1" noAdjustHandles="1" noChangeArrowheads="1" noChangeShapeType="1" noTextEdit="1"/>
+          </p:cNvSpPr>
+          <p:nvPr>
+            <p:extLst>
+              <p:ext uri="{386F3935-93C4-4BCD-93E2-E3B085C9AB24}">
+                <p16:designElem xmlns:p16="http://schemas.microsoft.com/office/powerpoint/2015/main" val="1"/>
+              </p:ext>
+            </p:extLst>
+          </p:nvPr>
+        </p:nvSpPr>
+        <p:spPr>
+          <a:xfrm>
+            <a:off x="0" y="0"/>
+            <a:ext cx="12192000" cy="6858000"/>
+          </a:xfrm>
+          <a:prstGeom prst="rect">
+            <a:avLst/>
+          </a:prstGeom>
+          <a:ln w="12700" cap="flat" cmpd="sng" algn="ctr">
+            <a:noFill/>
+            <a:prstDash val="solid"/>
+            <a:miter lim="800000"/>
+          </a:ln>
+          <a:effectLst/>
+        </p:spPr>
+        <p:style>
+          <a:lnRef idx="2">
+            <a:schemeClr val="accent1">
+              <a:shade val="50000"/>
+            </a:schemeClr>
+          </a:lnRef>
+          <a:fillRef idx="1">
+            <a:schemeClr val="accent1"/>
+          </a:fillRef>
+          <a:effectRef idx="0">
+            <a:schemeClr val="accent1"/>
+          </a:effectRef>
+          <a:fontRef idx="minor">
+            <a:schemeClr val="lt1"/>
+          </a:fontRef>
+        </p:style>
+        <p:txBody>
+          <a:bodyPr rtlCol="0" anchor="ctr"/>
+          <a:lstStyle/>
+          <a:p>
+            <a:pPr algn="ctr"/>
+            <a:endParaRPr lang="en-US"/>
+          </a:p>
+        </p:txBody>
+      </p:sp>
+      <p:sp>
+        <p:nvSpPr>
+          <p:cNvPr id="2" name="Title 1">
+            <a:extLst>
+              <a:ext uri="{FF2B5EF4-FFF2-40B4-BE49-F238E27FC236}">
+                <a16:creationId xmlns:a16="http://schemas.microsoft.com/office/drawing/2014/main" id="{807FBD87-1C7A-A13E-B5F7-BFAFF14050C2}"/>
+              </a:ext>
+            </a:extLst>
+          </p:cNvPr>
+          <p:cNvSpPr>
+            <a:spLocks noGrp="1"/>
+          </p:cNvSpPr>
+          <p:nvPr>
+            <p:ph type="title"/>
+          </p:nvPr>
+        </p:nvSpPr>
+        <p:spPr>
+          <a:xfrm>
+            <a:off x="1376226" y="953498"/>
+            <a:ext cx="8236456" cy="1141004"/>
+          </a:xfrm>
+        </p:spPr>
+        <p:txBody>
+          <a:bodyPr>
+            <a:normAutofit/>
+          </a:bodyPr>
+          <a:lstStyle/>
+          <a:p>
+            <a:pPr>
+              <a:lnSpc>
+                <a:spcPct val="110000"/>
+              </a:lnSpc>
+            </a:pPr>
+            <a:r>
+              <a:rPr lang="en-US" sz="2000" dirty="0" err="1"/>
+              <a:t>Aanbevelingen</a:t>
+            </a:r>
+            <a:r>
+              <a:rPr lang="en-US" sz="2000" dirty="0"/>
+              <a:t>:</a:t>
+            </a:r>
+            <a:br>
+              <a:rPr lang="en-US" sz="2000" dirty="0"/>
+            </a:br>
+            <a:br>
+              <a:rPr lang="en-US" sz="2000" dirty="0"/>
+            </a:br>
+            <a:endParaRPr lang="en-NL" sz="2000" dirty="0"/>
+          </a:p>
+        </p:txBody>
+      </p:sp>
+      <p:sp>
+        <p:nvSpPr>
+          <p:cNvPr id="4" name="Content Placeholder 3">
+            <a:extLst>
+              <a:ext uri="{FF2B5EF4-FFF2-40B4-BE49-F238E27FC236}">
+                <a16:creationId xmlns:a16="http://schemas.microsoft.com/office/drawing/2014/main" id="{2687657F-CE4C-E06F-83D5-7B674BD17D9E}"/>
+              </a:ext>
+            </a:extLst>
+          </p:cNvPr>
+          <p:cNvSpPr>
+            <a:spLocks noGrp="1"/>
+          </p:cNvSpPr>
+          <p:nvPr>
+            <p:ph idx="1"/>
+          </p:nvPr>
+        </p:nvSpPr>
+        <p:spPr/>
+        <p:txBody>
+          <a:bodyPr/>
+          <a:lstStyle/>
+          <a:p>
+            <a:r>
+              <a:rPr lang="nl-NL" dirty="0"/>
+              <a:t>Meerdere </a:t>
+            </a:r>
+            <a:r>
+              <a:rPr lang="nl-NL" dirty="0" err="1"/>
+              <a:t>IHM’s</a:t>
+            </a:r>
+            <a:r>
+              <a:rPr lang="nl-NL" dirty="0"/>
+              <a:t> beheren</a:t>
+            </a:r>
+          </a:p>
+          <a:p>
+            <a:r>
+              <a:rPr lang="en-US" dirty="0" err="1"/>
+              <a:t>Combineer</a:t>
+            </a:r>
+            <a:r>
+              <a:rPr lang="en-US" dirty="0"/>
+              <a:t> </a:t>
+            </a:r>
+            <a:r>
+              <a:rPr lang="en-US" dirty="0" err="1"/>
+              <a:t>WiFi</a:t>
+            </a:r>
+            <a:r>
+              <a:rPr lang="en-US" dirty="0"/>
+              <a:t> </a:t>
+            </a:r>
+            <a:r>
+              <a:rPr lang="en-US" dirty="0" err="1"/>
+              <a:t>en</a:t>
+            </a:r>
+            <a:r>
+              <a:rPr lang="en-US" dirty="0"/>
+              <a:t> LoRa </a:t>
+            </a:r>
+            <a:r>
+              <a:rPr lang="en-US" dirty="0" err="1"/>
+              <a:t>functionaliteit</a:t>
+            </a:r>
+            <a:r>
+              <a:rPr lang="en-US" dirty="0"/>
+              <a:t>.</a:t>
+            </a:r>
+          </a:p>
+          <a:p>
+            <a:r>
+              <a:rPr lang="en-US" dirty="0" err="1"/>
+              <a:t>Antenne</a:t>
+            </a:r>
+            <a:r>
+              <a:rPr lang="en-US" dirty="0"/>
+              <a:t>?</a:t>
+            </a:r>
+            <a:endParaRPr lang="en-NL" dirty="0"/>
+          </a:p>
+        </p:txBody>
+      </p:sp>
+    </p:spTree>
+    <p:extLst>
+      <p:ext uri="{BB962C8B-B14F-4D97-AF65-F5344CB8AC3E}">
+        <p14:creationId xmlns:p14="http://schemas.microsoft.com/office/powerpoint/2010/main" val="468878079"/>
+      </p:ext>
+    </p:extLst>
+  </p:cSld>
+  <p:clrMapOvr>
+    <a:overrideClrMapping bg1="lt1" tx1="dk1" bg2="lt2" tx2="dk2" accent1="accent1" accent2="accent2" accent3="accent3" accent4="accent4" accent5="accent5" accent6="accent6" hlink="hlink" folHlink="folHlink"/>
+  </p:clrMapOvr>
+</p:sld>
+</file>
+
 <file path=ppt/slides/slide2.xml><?xml version="1.0" encoding="utf-8"?>
 <p:sld xmlns:a="http://schemas.openxmlformats.org/drawingml/2006/main" xmlns:r="http://schemas.openxmlformats.org/officeDocument/2006/relationships" xmlns:p="http://schemas.openxmlformats.org/presentationml/2006/main">
   <p:cSld>
@@ -9954,7 +10419,7 @@
         </p:nvSpPr>
         <p:spPr>
           <a:xfrm>
-            <a:off x="1111117" y="1144996"/>
+            <a:off x="1111117" y="795746"/>
             <a:ext cx="8236456" cy="1141004"/>
           </a:xfrm>
         </p:spPr>
@@ -9991,28 +10456,117 @@
           </a:p>
         </p:txBody>
       </p:sp>
-      <p:sp>
-        <p:nvSpPr>
-          <p:cNvPr id="3" name="Content Placeholder 2">
+      <p:pic>
+        <p:nvPicPr>
+          <p:cNvPr id="5" name="Content Placeholder 4" descr="A screenshot of a computer&#10;&#10;Description automatically generated">
             <a:extLst>
               <a:ext uri="{FF2B5EF4-FFF2-40B4-BE49-F238E27FC236}">
-                <a16:creationId xmlns:a16="http://schemas.microsoft.com/office/drawing/2014/main" id="{B75F8428-D75F-704C-928A-CD33A88A9153}"/>
+                <a16:creationId xmlns:a16="http://schemas.microsoft.com/office/drawing/2014/main" id="{BD46E8B8-5AC3-3A07-AD15-1F14B0EA6713}"/>
               </a:ext>
             </a:extLst>
           </p:cNvPr>
-          <p:cNvSpPr>
-            <a:spLocks noGrp="1"/>
-          </p:cNvSpPr>
+          <p:cNvPicPr>
+            <a:picLocks noGrp="1" noChangeAspect="1"/>
+          </p:cNvPicPr>
           <p:nvPr>
             <p:ph idx="1"/>
           </p:nvPr>
-        </p:nvSpPr>
-        <p:spPr/>
+        </p:nvPicPr>
+        <p:blipFill rotWithShape="1">
+          <a:blip r:embed="rId3">
+            <a:extLst>
+              <a:ext uri="{28A0092B-C50C-407E-A947-70E740481C1C}">
+                <a14:useLocalDpi xmlns:a14="http://schemas.microsoft.com/office/drawing/2010/main" val="0"/>
+              </a:ext>
+            </a:extLst>
+          </a:blip>
+          <a:srcRect l="185" t="855" r="892" b="46698"/>
+          <a:stretch/>
+        </p:blipFill>
+        <p:spPr>
+          <a:xfrm>
+            <a:off x="1111117" y="2835683"/>
+            <a:ext cx="9477581" cy="2821757"/>
+          </a:xfrm>
+        </p:spPr>
+      </p:pic>
+      <p:sp>
+        <p:nvSpPr>
+          <p:cNvPr id="6" name="TextBox 5">
+            <a:extLst>
+              <a:ext uri="{FF2B5EF4-FFF2-40B4-BE49-F238E27FC236}">
+                <a16:creationId xmlns:a16="http://schemas.microsoft.com/office/drawing/2014/main" id="{95349EA2-7B51-6950-48CA-DCB472E5222D}"/>
+              </a:ext>
+            </a:extLst>
+          </p:cNvPr>
+          <p:cNvSpPr txBox="1"/>
+          <p:nvPr/>
+        </p:nvSpPr>
+        <p:spPr>
+          <a:xfrm>
+            <a:off x="1111117" y="1635123"/>
+            <a:ext cx="9414351" cy="1477328"/>
+          </a:xfrm>
+          <a:prstGeom prst="rect">
+            <a:avLst/>
+          </a:prstGeom>
+          <a:noFill/>
+        </p:spPr>
         <p:txBody>
-          <a:bodyPr/>
+          <a:bodyPr wrap="square" rtlCol="0">
+            <a:spAutoFit/>
+          </a:bodyPr>
           <a:lstStyle/>
           <a:p>
-            <a:endParaRPr lang="en-NL"/>
+            <a:r>
+              <a:rPr lang="en-US" dirty="0">
+                <a:solidFill>
+                  <a:srgbClr val="FF0000"/>
+                </a:solidFill>
+              </a:rPr>
+              <a:t>Admin/Schip Owner</a:t>
+            </a:r>
+          </a:p>
+          <a:p>
+            <a:r>
+              <a:rPr lang="en-US" dirty="0">
+                <a:solidFill>
+                  <a:schemeClr val="accent6">
+                    <a:lumMod val="60000"/>
+                    <a:lumOff val="40000"/>
+                  </a:schemeClr>
+                </a:solidFill>
+              </a:rPr>
+              <a:t>Consensus</a:t>
+            </a:r>
+          </a:p>
+          <a:p>
+            <a:r>
+              <a:rPr lang="en-US" dirty="0">
+                <a:solidFill>
+                  <a:srgbClr val="00B0F0"/>
+                </a:solidFill>
+              </a:rPr>
+              <a:t>Upload</a:t>
+            </a:r>
+          </a:p>
+          <a:p>
+            <a:r>
+              <a:rPr lang="en-US" dirty="0" err="1">
+                <a:solidFill>
+                  <a:srgbClr val="7030A0"/>
+                </a:solidFill>
+              </a:rPr>
+              <a:t>Bekijker</a:t>
+            </a:r>
+            <a:endParaRPr lang="en-US" dirty="0">
+              <a:solidFill>
+                <a:srgbClr val="7030A0"/>
+              </a:solidFill>
+            </a:endParaRPr>
+          </a:p>
+          <a:p>
+            <a:endParaRPr lang="en-NL" dirty="0"/>
           </a:p>
         </p:txBody>
       </p:sp>
@@ -10551,7 +11105,11 @@
             </a:r>
             <a:r>
               <a:rPr lang="en-US" sz="2000" dirty="0"/>
-              <a:t> blockchain</a:t>
+              <a:t> blockchain+ </a:t>
+            </a:r>
+            <a:r>
+              <a:rPr lang="en-US" sz="2000" dirty="0" err="1"/>
+              <a:t>aPp</a:t>
             </a:r>
             <a:br>
               <a:rPr lang="en-US" sz="2000" dirty="0"/>

</xml_diff>